<commit_message>
updated for defin conference
</commit_message>
<xml_diff>
--- a/talks/Zi Conference Round Table.pptx
+++ b/talks/Zi Conference Round Table.pptx
@@ -205,7 +205,7 @@
           <a:p>
             <a:fld id="{C04E6B89-6523-4777-A7AA-580E160AA308}" type="datetimeFigureOut">
               <a:rPr lang="en-US" smtClean="0"/>
-              <a:t>10/22/2021</a:t>
+              <a:t>11/17/2021</a:t>
             </a:fld>
             <a:endParaRPr lang="en-US"/>
           </a:p>
@@ -1441,7 +1441,7 @@
           <a:p>
             <a:fld id="{F29A9CBD-B2DF-4A3D-8556-A5634B74F3A9}" type="datetimeFigureOut">
               <a:rPr lang="en-US" smtClean="0"/>
-              <a:t>10/22/2021</a:t>
+              <a:t>11/17/2021</a:t>
             </a:fld>
             <a:endParaRPr lang="en-US"/>
           </a:p>
@@ -1639,7 +1639,7 @@
           <a:p>
             <a:fld id="{F29A9CBD-B2DF-4A3D-8556-A5634B74F3A9}" type="datetimeFigureOut">
               <a:rPr lang="en-US" smtClean="0"/>
-              <a:t>10/22/2021</a:t>
+              <a:t>11/17/2021</a:t>
             </a:fld>
             <a:endParaRPr lang="en-US"/>
           </a:p>
@@ -1847,7 +1847,7 @@
           <a:p>
             <a:fld id="{F29A9CBD-B2DF-4A3D-8556-A5634B74F3A9}" type="datetimeFigureOut">
               <a:rPr lang="en-US" smtClean="0"/>
-              <a:t>10/22/2021</a:t>
+              <a:t>11/17/2021</a:t>
             </a:fld>
             <a:endParaRPr lang="en-US"/>
           </a:p>
@@ -2045,7 +2045,7 @@
           <a:p>
             <a:fld id="{F29A9CBD-B2DF-4A3D-8556-A5634B74F3A9}" type="datetimeFigureOut">
               <a:rPr lang="en-US" smtClean="0"/>
-              <a:t>10/22/2021</a:t>
+              <a:t>11/17/2021</a:t>
             </a:fld>
             <a:endParaRPr lang="en-US"/>
           </a:p>
@@ -2320,7 +2320,7 @@
           <a:p>
             <a:fld id="{F29A9CBD-B2DF-4A3D-8556-A5634B74F3A9}" type="datetimeFigureOut">
               <a:rPr lang="en-US" smtClean="0"/>
-              <a:t>10/22/2021</a:t>
+              <a:t>11/17/2021</a:t>
             </a:fld>
             <a:endParaRPr lang="en-US"/>
           </a:p>
@@ -2585,7 +2585,7 @@
           <a:p>
             <a:fld id="{F29A9CBD-B2DF-4A3D-8556-A5634B74F3A9}" type="datetimeFigureOut">
               <a:rPr lang="en-US" smtClean="0"/>
-              <a:t>10/22/2021</a:t>
+              <a:t>11/17/2021</a:t>
             </a:fld>
             <a:endParaRPr lang="en-US"/>
           </a:p>
@@ -2997,7 +2997,7 @@
           <a:p>
             <a:fld id="{F29A9CBD-B2DF-4A3D-8556-A5634B74F3A9}" type="datetimeFigureOut">
               <a:rPr lang="en-US" smtClean="0"/>
-              <a:t>10/22/2021</a:t>
+              <a:t>11/17/2021</a:t>
             </a:fld>
             <a:endParaRPr lang="en-US"/>
           </a:p>
@@ -3138,7 +3138,7 @@
           <a:p>
             <a:fld id="{F29A9CBD-B2DF-4A3D-8556-A5634B74F3A9}" type="datetimeFigureOut">
               <a:rPr lang="en-US" smtClean="0"/>
-              <a:t>10/22/2021</a:t>
+              <a:t>11/17/2021</a:t>
             </a:fld>
             <a:endParaRPr lang="en-US"/>
           </a:p>
@@ -3251,7 +3251,7 @@
           <a:p>
             <a:fld id="{F29A9CBD-B2DF-4A3D-8556-A5634B74F3A9}" type="datetimeFigureOut">
               <a:rPr lang="en-US" smtClean="0"/>
-              <a:t>10/22/2021</a:t>
+              <a:t>11/17/2021</a:t>
             </a:fld>
             <a:endParaRPr lang="en-US"/>
           </a:p>
@@ -3562,7 +3562,7 @@
           <a:p>
             <a:fld id="{F29A9CBD-B2DF-4A3D-8556-A5634B74F3A9}" type="datetimeFigureOut">
               <a:rPr lang="en-US" smtClean="0"/>
-              <a:t>10/22/2021</a:t>
+              <a:t>11/17/2021</a:t>
             </a:fld>
             <a:endParaRPr lang="en-US"/>
           </a:p>
@@ -3850,7 +3850,7 @@
           <a:p>
             <a:fld id="{F29A9CBD-B2DF-4A3D-8556-A5634B74F3A9}" type="datetimeFigureOut">
               <a:rPr lang="en-US" smtClean="0"/>
-              <a:t>10/22/2021</a:t>
+              <a:t>11/17/2021</a:t>
             </a:fld>
             <a:endParaRPr lang="en-US"/>
           </a:p>
@@ -4091,7 +4091,7 @@
           <a:p>
             <a:fld id="{F29A9CBD-B2DF-4A3D-8556-A5634B74F3A9}" type="datetimeFigureOut">
               <a:rPr lang="en-US" smtClean="0"/>
-              <a:t>10/22/2021</a:t>
+              <a:t>11/17/2021</a:t>
             </a:fld>
             <a:endParaRPr lang="en-US"/>
           </a:p>
@@ -11101,7 +11101,7 @@
             </a:pPr>
             <a:r>
               <a:rPr lang="en-US" altLang="en-US" sz="1800" dirty="0"/>
-              <a:t>Message Rules</a:t>
+              <a:t>Message Rule Filters</a:t>
             </a:r>
           </a:p>
         </p:txBody>

</xml_diff>